<commit_message>
adding more slides to presentation
</commit_message>
<xml_diff>
--- a/CodePresentation.pptx
+++ b/CodePresentation.pptx
@@ -8,9 +8,11 @@
     <p:sldId id="256" r:id="rId2"/>
     <p:sldId id="260" r:id="rId3"/>
     <p:sldId id="261" r:id="rId4"/>
-    <p:sldId id="257" r:id="rId5"/>
-    <p:sldId id="258" r:id="rId6"/>
-    <p:sldId id="259" r:id="rId7"/>
+    <p:sldId id="263" r:id="rId5"/>
+    <p:sldId id="262" r:id="rId6"/>
+    <p:sldId id="257" r:id="rId7"/>
+    <p:sldId id="258" r:id="rId8"/>
+    <p:sldId id="259" r:id="rId9"/>
   </p:sldIdLst>
   <p:sldSz cx="9144000" cy="6858000" type="screen4x3"/>
   <p:notesSz cx="6858000" cy="9144000"/>
@@ -293,6 +295,7 @@
           <a:p>
             <a:fld id="{B191CCE5-3872-40B0-B125-F9344C75672A}" type="datetimeFigureOut">
               <a:rPr lang="en-US" smtClean="0"/>
+              <a:pPr/>
               <a:t>9/23/2014</a:t>
             </a:fld>
             <a:endParaRPr lang="en-GB"/>
@@ -335,6 +338,7 @@
           <a:p>
             <a:fld id="{464211A8-6881-459E-BD04-6993518C01C1}" type="slidenum">
               <a:rPr lang="en-GB" smtClean="0"/>
+              <a:pPr/>
               <a:t>‹#›</a:t>
             </a:fld>
             <a:endParaRPr lang="en-GB"/>
@@ -458,6 +462,7 @@
           <a:p>
             <a:fld id="{B191CCE5-3872-40B0-B125-F9344C75672A}" type="datetimeFigureOut">
               <a:rPr lang="en-US" smtClean="0"/>
+              <a:pPr/>
               <a:t>9/23/2014</a:t>
             </a:fld>
             <a:endParaRPr lang="en-GB"/>
@@ -500,6 +505,7 @@
           <a:p>
             <a:fld id="{464211A8-6881-459E-BD04-6993518C01C1}" type="slidenum">
               <a:rPr lang="en-GB" smtClean="0"/>
+              <a:pPr/>
               <a:t>‹#›</a:t>
             </a:fld>
             <a:endParaRPr lang="en-GB"/>
@@ -633,6 +639,7 @@
           <a:p>
             <a:fld id="{B191CCE5-3872-40B0-B125-F9344C75672A}" type="datetimeFigureOut">
               <a:rPr lang="en-US" smtClean="0"/>
+              <a:pPr/>
               <a:t>9/23/2014</a:t>
             </a:fld>
             <a:endParaRPr lang="en-GB"/>
@@ -675,6 +682,7 @@
           <a:p>
             <a:fld id="{464211A8-6881-459E-BD04-6993518C01C1}" type="slidenum">
               <a:rPr lang="en-GB" smtClean="0"/>
+              <a:pPr/>
               <a:t>‹#›</a:t>
             </a:fld>
             <a:endParaRPr lang="en-GB"/>
@@ -798,6 +806,7 @@
           <a:p>
             <a:fld id="{B191CCE5-3872-40B0-B125-F9344C75672A}" type="datetimeFigureOut">
               <a:rPr lang="en-US" smtClean="0"/>
+              <a:pPr/>
               <a:t>9/23/2014</a:t>
             </a:fld>
             <a:endParaRPr lang="en-GB"/>
@@ -840,6 +849,7 @@
           <a:p>
             <a:fld id="{464211A8-6881-459E-BD04-6993518C01C1}" type="slidenum">
               <a:rPr lang="en-GB" smtClean="0"/>
+              <a:pPr/>
               <a:t>‹#›</a:t>
             </a:fld>
             <a:endParaRPr lang="en-GB"/>
@@ -1039,6 +1049,7 @@
           <a:p>
             <a:fld id="{B191CCE5-3872-40B0-B125-F9344C75672A}" type="datetimeFigureOut">
               <a:rPr lang="en-US" smtClean="0"/>
+              <a:pPr/>
               <a:t>9/23/2014</a:t>
             </a:fld>
             <a:endParaRPr lang="en-GB"/>
@@ -1081,6 +1092,7 @@
           <a:p>
             <a:fld id="{464211A8-6881-459E-BD04-6993518C01C1}" type="slidenum">
               <a:rPr lang="en-GB" smtClean="0"/>
+              <a:pPr/>
               <a:t>‹#›</a:t>
             </a:fld>
             <a:endParaRPr lang="en-GB"/>
@@ -1322,6 +1334,7 @@
           <a:p>
             <a:fld id="{B191CCE5-3872-40B0-B125-F9344C75672A}" type="datetimeFigureOut">
               <a:rPr lang="en-US" smtClean="0"/>
+              <a:pPr/>
               <a:t>9/23/2014</a:t>
             </a:fld>
             <a:endParaRPr lang="en-GB"/>
@@ -1364,6 +1377,7 @@
           <a:p>
             <a:fld id="{464211A8-6881-459E-BD04-6993518C01C1}" type="slidenum">
               <a:rPr lang="en-GB" smtClean="0"/>
+              <a:pPr/>
               <a:t>‹#›</a:t>
             </a:fld>
             <a:endParaRPr lang="en-GB"/>
@@ -1739,6 +1753,7 @@
           <a:p>
             <a:fld id="{B191CCE5-3872-40B0-B125-F9344C75672A}" type="datetimeFigureOut">
               <a:rPr lang="en-US" smtClean="0"/>
+              <a:pPr/>
               <a:t>9/23/2014</a:t>
             </a:fld>
             <a:endParaRPr lang="en-GB"/>
@@ -1781,6 +1796,7 @@
           <a:p>
             <a:fld id="{464211A8-6881-459E-BD04-6993518C01C1}" type="slidenum">
               <a:rPr lang="en-GB" smtClean="0"/>
+              <a:pPr/>
               <a:t>‹#›</a:t>
             </a:fld>
             <a:endParaRPr lang="en-GB"/>
@@ -1852,6 +1868,7 @@
           <a:p>
             <a:fld id="{B191CCE5-3872-40B0-B125-F9344C75672A}" type="datetimeFigureOut">
               <a:rPr lang="en-US" smtClean="0"/>
+              <a:pPr/>
               <a:t>9/23/2014</a:t>
             </a:fld>
             <a:endParaRPr lang="en-GB"/>
@@ -1894,6 +1911,7 @@
           <a:p>
             <a:fld id="{464211A8-6881-459E-BD04-6993518C01C1}" type="slidenum">
               <a:rPr lang="en-GB" smtClean="0"/>
+              <a:pPr/>
               <a:t>‹#›</a:t>
             </a:fld>
             <a:endParaRPr lang="en-GB"/>
@@ -1942,6 +1960,7 @@
           <a:p>
             <a:fld id="{B191CCE5-3872-40B0-B125-F9344C75672A}" type="datetimeFigureOut">
               <a:rPr lang="en-US" smtClean="0"/>
+              <a:pPr/>
               <a:t>9/23/2014</a:t>
             </a:fld>
             <a:endParaRPr lang="en-GB"/>
@@ -1984,6 +2003,7 @@
           <a:p>
             <a:fld id="{464211A8-6881-459E-BD04-6993518C01C1}" type="slidenum">
               <a:rPr lang="en-GB" smtClean="0"/>
+              <a:pPr/>
               <a:t>‹#›</a:t>
             </a:fld>
             <a:endParaRPr lang="en-GB"/>
@@ -2214,6 +2234,7 @@
           <a:p>
             <a:fld id="{B191CCE5-3872-40B0-B125-F9344C75672A}" type="datetimeFigureOut">
               <a:rPr lang="en-US" smtClean="0"/>
+              <a:pPr/>
               <a:t>9/23/2014</a:t>
             </a:fld>
             <a:endParaRPr lang="en-GB"/>
@@ -2256,6 +2277,7 @@
           <a:p>
             <a:fld id="{464211A8-6881-459E-BD04-6993518C01C1}" type="slidenum">
               <a:rPr lang="en-GB" smtClean="0"/>
+              <a:pPr/>
               <a:t>‹#›</a:t>
             </a:fld>
             <a:endParaRPr lang="en-GB"/>
@@ -2462,6 +2484,7 @@
           <a:p>
             <a:fld id="{B191CCE5-3872-40B0-B125-F9344C75672A}" type="datetimeFigureOut">
               <a:rPr lang="en-US" smtClean="0"/>
+              <a:pPr/>
               <a:t>9/23/2014</a:t>
             </a:fld>
             <a:endParaRPr lang="en-GB"/>
@@ -2504,6 +2527,7 @@
           <a:p>
             <a:fld id="{464211A8-6881-459E-BD04-6993518C01C1}" type="slidenum">
               <a:rPr lang="en-GB" smtClean="0"/>
+              <a:pPr/>
               <a:t>‹#›</a:t>
             </a:fld>
             <a:endParaRPr lang="en-GB"/>
@@ -2673,6 +2697,7 @@
           <a:p>
             <a:fld id="{B191CCE5-3872-40B0-B125-F9344C75672A}" type="datetimeFigureOut">
               <a:rPr lang="en-US" smtClean="0"/>
+              <a:pPr/>
               <a:t>9/23/2014</a:t>
             </a:fld>
             <a:endParaRPr lang="en-GB"/>
@@ -2751,6 +2776,7 @@
           <a:p>
             <a:fld id="{464211A8-6881-459E-BD04-6993518C01C1}" type="slidenum">
               <a:rPr lang="en-GB" smtClean="0"/>
+              <a:pPr/>
               <a:t>‹#›</a:t>
             </a:fld>
             <a:endParaRPr lang="en-GB"/>
@@ -3183,6 +3209,88 @@
           <a:bodyPr/>
           <a:lstStyle/>
           <a:p>
+            <a:r>
+              <a:rPr lang="en-US" dirty="0" smtClean="0">
+                <a:solidFill>
+                  <a:srgbClr val="FFC000"/>
+                </a:solidFill>
+                <a:ea typeface="Times New Roman"/>
+                <a:cs typeface="Consolas" pitchFamily="49" charset="0"/>
+              </a:rPr>
+              <a:t>Most </a:t>
+            </a:r>
+            <a:r>
+              <a:rPr lang="en-US" dirty="0" smtClean="0">
+                <a:solidFill>
+                  <a:srgbClr val="C00000"/>
+                </a:solidFill>
+                <a:latin typeface="Consolas" pitchFamily="49" charset="0"/>
+                <a:ea typeface="Times New Roman"/>
+                <a:cs typeface="Consolas" pitchFamily="49" charset="0"/>
+              </a:rPr>
+              <a:t>if</a:t>
+            </a:r>
+            <a:r>
+              <a:rPr lang="en-US" dirty="0" smtClean="0">
+                <a:solidFill>
+                  <a:srgbClr val="C00000"/>
+                </a:solidFill>
+                <a:ea typeface="Times New Roman"/>
+                <a:cs typeface="Consolas" pitchFamily="49" charset="0"/>
+              </a:rPr>
+              <a:t>s</a:t>
+            </a:r>
+            <a:r>
+              <a:rPr lang="en-US" dirty="0" smtClean="0">
+                <a:solidFill>
+                  <a:srgbClr val="FFC000"/>
+                </a:solidFill>
+                <a:ea typeface="Times New Roman"/>
+                <a:cs typeface="Consolas" pitchFamily="49" charset="0"/>
+              </a:rPr>
+              <a:t> can be replaced with </a:t>
+            </a:r>
+            <a:r>
+              <a:rPr lang="en-US" dirty="0" smtClean="0">
+                <a:solidFill>
+                  <a:srgbClr val="FFC000"/>
+                </a:solidFill>
+                <a:ea typeface="Times New Roman"/>
+                <a:cs typeface="Consolas" pitchFamily="49" charset="0"/>
+              </a:rPr>
+              <a:t>polymorphism</a:t>
+            </a:r>
+            <a:endParaRPr lang="en-GB" dirty="0" smtClean="0">
+              <a:solidFill>
+                <a:srgbClr val="FFC000"/>
+              </a:solidFill>
+              <a:ea typeface="Times New Roman"/>
+              <a:cs typeface="Consolas" pitchFamily="49" charset="0"/>
+            </a:endParaRPr>
+          </a:p>
+          <a:p>
+            <a:r>
+              <a:rPr lang="en-GB" dirty="0" smtClean="0">
+                <a:solidFill>
+                  <a:srgbClr val="FFC000"/>
+                </a:solidFill>
+                <a:ea typeface="Times New Roman"/>
+                <a:cs typeface="Consolas" pitchFamily="49" charset="0"/>
+              </a:rPr>
+              <a:t>What is polymorphism </a:t>
+            </a:r>
+            <a:r>
+              <a:rPr lang="en-GB" dirty="0" smtClean="0">
+                <a:solidFill>
+                  <a:schemeClr val="bg1"/>
+                </a:solidFill>
+                <a:ea typeface="Times New Roman"/>
+                <a:cs typeface="Consolas" pitchFamily="49" charset="0"/>
+              </a:rPr>
+              <a:t>?</a:t>
+            </a:r>
+          </a:p>
+          <a:p>
             <a:endParaRPr lang="en-US" dirty="0" smtClean="0">
               <a:solidFill>
                 <a:schemeClr val="bg1"/>
@@ -3191,44 +3299,32 @@
               <a:cs typeface="Consolas" pitchFamily="49" charset="0"/>
             </a:endParaRPr>
           </a:p>
-          <a:p>
-            <a:r>
-              <a:rPr lang="en-US" dirty="0" smtClean="0">
-                <a:solidFill>
-                  <a:schemeClr val="bg1"/>
-                </a:solidFill>
-                <a:ea typeface="Times New Roman"/>
-                <a:cs typeface="Consolas" pitchFamily="49" charset="0"/>
-              </a:rPr>
-              <a:t>Most </a:t>
-            </a:r>
-            <a:r>
-              <a:rPr lang="en-US" dirty="0" smtClean="0">
-                <a:solidFill>
-                  <a:srgbClr val="FF0000"/>
-                </a:solidFill>
-                <a:latin typeface="Consolas" pitchFamily="49" charset="0"/>
-                <a:ea typeface="Times New Roman"/>
-                <a:cs typeface="Consolas" pitchFamily="49" charset="0"/>
-              </a:rPr>
-              <a:t>if</a:t>
-            </a:r>
-            <a:r>
-              <a:rPr lang="en-US" dirty="0" smtClean="0">
-                <a:solidFill>
-                  <a:schemeClr val="bg1"/>
-                </a:solidFill>
-                <a:ea typeface="Times New Roman"/>
-                <a:cs typeface="Consolas" pitchFamily="49" charset="0"/>
-              </a:rPr>
-              <a:t>s can be replaced with polymorphism</a:t>
-            </a:r>
-          </a:p>
-          <a:p>
-            <a:endParaRPr lang="en-GB" dirty="0"/>
-          </a:p>
-        </p:txBody>
-      </p:sp>
+        </p:txBody>
+      </p:sp>
+      <p:pic>
+        <p:nvPicPr>
+          <p:cNvPr id="4" name="Picture 3" descr="polymorphism.png"/>
+          <p:cNvPicPr>
+            <a:picLocks noChangeAspect="1"/>
+          </p:cNvPicPr>
+          <p:nvPr/>
+        </p:nvPicPr>
+        <p:blipFill>
+          <a:blip r:embed="rId2"/>
+          <a:stretch>
+            <a:fillRect/>
+          </a:stretch>
+        </p:blipFill>
+        <p:spPr>
+          <a:xfrm>
+            <a:off x="1714480" y="3000372"/>
+            <a:ext cx="4541095" cy="3267914"/>
+          </a:xfrm>
+          <a:prstGeom prst="rect">
+            <a:avLst/>
+          </a:prstGeom>
+        </p:spPr>
+      </p:pic>
     </p:spTree>
   </p:cSld>
   <p:clrMapOvr>
@@ -3237,7 +3333,224 @@
   <p:timing>
     <p:tnLst>
       <p:par>
-        <p:cTn id="1" dur="indefinite" restart="never" nodeType="tmRoot"/>
+        <p:cTn id="1" dur="indefinite" restart="never" nodeType="tmRoot">
+          <p:childTnLst>
+            <p:seq concurrent="1" nextAc="seek">
+              <p:cTn id="2" dur="indefinite" nodeType="mainSeq">
+                <p:childTnLst>
+                  <p:par>
+                    <p:cTn id="3" fill="hold">
+                      <p:stCondLst>
+                        <p:cond delay="indefinite"/>
+                      </p:stCondLst>
+                      <p:childTnLst>
+                        <p:par>
+                          <p:cTn id="4" fill="hold">
+                            <p:stCondLst>
+                              <p:cond delay="0"/>
+                            </p:stCondLst>
+                            <p:childTnLst>
+                              <p:par>
+                                <p:cTn id="5" presetID="2" presetClass="entr" presetSubtype="4" fill="hold" nodeType="clickEffect">
+                                  <p:stCondLst>
+                                    <p:cond delay="0"/>
+                                  </p:stCondLst>
+                                  <p:childTnLst>
+                                    <p:set>
+                                      <p:cBhvr>
+                                        <p:cTn id="6" dur="1" fill="hold">
+                                          <p:stCondLst>
+                                            <p:cond delay="0"/>
+                                          </p:stCondLst>
+                                        </p:cTn>
+                                        <p:tgtEl>
+                                          <p:spTgt spid="3">
+                                            <p:txEl>
+                                              <p:pRg st="1" end="1"/>
+                                            </p:txEl>
+                                          </p:spTgt>
+                                        </p:tgtEl>
+                                        <p:attrNameLst>
+                                          <p:attrName>style.visibility</p:attrName>
+                                        </p:attrNameLst>
+                                      </p:cBhvr>
+                                      <p:to>
+                                        <p:strVal val="visible"/>
+                                      </p:to>
+                                    </p:set>
+                                    <p:anim calcmode="lin" valueType="num">
+                                      <p:cBhvr additive="base">
+                                        <p:cTn id="7" dur="500" fill="hold"/>
+                                        <p:tgtEl>
+                                          <p:spTgt spid="3">
+                                            <p:txEl>
+                                              <p:pRg st="1" end="1"/>
+                                            </p:txEl>
+                                          </p:spTgt>
+                                        </p:tgtEl>
+                                        <p:attrNameLst>
+                                          <p:attrName>ppt_x</p:attrName>
+                                        </p:attrNameLst>
+                                      </p:cBhvr>
+                                      <p:tavLst>
+                                        <p:tav tm="0">
+                                          <p:val>
+                                            <p:strVal val="#ppt_x"/>
+                                          </p:val>
+                                        </p:tav>
+                                        <p:tav tm="100000">
+                                          <p:val>
+                                            <p:strVal val="#ppt_x"/>
+                                          </p:val>
+                                        </p:tav>
+                                      </p:tavLst>
+                                    </p:anim>
+                                    <p:anim calcmode="lin" valueType="num">
+                                      <p:cBhvr additive="base">
+                                        <p:cTn id="8" dur="500" fill="hold"/>
+                                        <p:tgtEl>
+                                          <p:spTgt spid="3">
+                                            <p:txEl>
+                                              <p:pRg st="1" end="1"/>
+                                            </p:txEl>
+                                          </p:spTgt>
+                                        </p:tgtEl>
+                                        <p:attrNameLst>
+                                          <p:attrName>ppt_y</p:attrName>
+                                        </p:attrNameLst>
+                                      </p:cBhvr>
+                                      <p:tavLst>
+                                        <p:tav tm="0">
+                                          <p:val>
+                                            <p:strVal val="1+#ppt_h/2"/>
+                                          </p:val>
+                                        </p:tav>
+                                        <p:tav tm="100000">
+                                          <p:val>
+                                            <p:strVal val="#ppt_y"/>
+                                          </p:val>
+                                        </p:tav>
+                                      </p:tavLst>
+                                    </p:anim>
+                                  </p:childTnLst>
+                                </p:cTn>
+                              </p:par>
+                            </p:childTnLst>
+                          </p:cTn>
+                        </p:par>
+                      </p:childTnLst>
+                    </p:cTn>
+                  </p:par>
+                  <p:par>
+                    <p:cTn id="9" fill="hold">
+                      <p:stCondLst>
+                        <p:cond delay="indefinite"/>
+                      </p:stCondLst>
+                      <p:childTnLst>
+                        <p:par>
+                          <p:cTn id="10" fill="hold">
+                            <p:stCondLst>
+                              <p:cond delay="0"/>
+                            </p:stCondLst>
+                            <p:childTnLst>
+                              <p:par>
+                                <p:cTn id="11" presetID="2" presetClass="entr" presetSubtype="4" fill="hold" nodeType="clickEffect">
+                                  <p:stCondLst>
+                                    <p:cond delay="0"/>
+                                  </p:stCondLst>
+                                  <p:childTnLst>
+                                    <p:set>
+                                      <p:cBhvr>
+                                        <p:cTn id="12" dur="1" fill="hold">
+                                          <p:stCondLst>
+                                            <p:cond delay="0"/>
+                                          </p:stCondLst>
+                                        </p:cTn>
+                                        <p:tgtEl>
+                                          <p:spTgt spid="4"/>
+                                        </p:tgtEl>
+                                        <p:attrNameLst>
+                                          <p:attrName>style.visibility</p:attrName>
+                                        </p:attrNameLst>
+                                      </p:cBhvr>
+                                      <p:to>
+                                        <p:strVal val="visible"/>
+                                      </p:to>
+                                    </p:set>
+                                    <p:anim calcmode="lin" valueType="num">
+                                      <p:cBhvr additive="base">
+                                        <p:cTn id="13" dur="500" fill="hold"/>
+                                        <p:tgtEl>
+                                          <p:spTgt spid="4"/>
+                                        </p:tgtEl>
+                                        <p:attrNameLst>
+                                          <p:attrName>ppt_x</p:attrName>
+                                        </p:attrNameLst>
+                                      </p:cBhvr>
+                                      <p:tavLst>
+                                        <p:tav tm="0">
+                                          <p:val>
+                                            <p:strVal val="#ppt_x"/>
+                                          </p:val>
+                                        </p:tav>
+                                        <p:tav tm="100000">
+                                          <p:val>
+                                            <p:strVal val="#ppt_x"/>
+                                          </p:val>
+                                        </p:tav>
+                                      </p:tavLst>
+                                    </p:anim>
+                                    <p:anim calcmode="lin" valueType="num">
+                                      <p:cBhvr additive="base">
+                                        <p:cTn id="14" dur="500" fill="hold"/>
+                                        <p:tgtEl>
+                                          <p:spTgt spid="4"/>
+                                        </p:tgtEl>
+                                        <p:attrNameLst>
+                                          <p:attrName>ppt_y</p:attrName>
+                                        </p:attrNameLst>
+                                      </p:cBhvr>
+                                      <p:tavLst>
+                                        <p:tav tm="0">
+                                          <p:val>
+                                            <p:strVal val="1+#ppt_h/2"/>
+                                          </p:val>
+                                        </p:tav>
+                                        <p:tav tm="100000">
+                                          <p:val>
+                                            <p:strVal val="#ppt_y"/>
+                                          </p:val>
+                                        </p:tav>
+                                      </p:tavLst>
+                                    </p:anim>
+                                  </p:childTnLst>
+                                </p:cTn>
+                              </p:par>
+                            </p:childTnLst>
+                          </p:cTn>
+                        </p:par>
+                      </p:childTnLst>
+                    </p:cTn>
+                  </p:par>
+                </p:childTnLst>
+              </p:cTn>
+              <p:prevCondLst>
+                <p:cond evt="onPrev" delay="0">
+                  <p:tgtEl>
+                    <p:sldTgt/>
+                  </p:tgtEl>
+                </p:cond>
+              </p:prevCondLst>
+              <p:nextCondLst>
+                <p:cond evt="onNext" delay="0">
+                  <p:tgtEl>
+                    <p:sldTgt/>
+                  </p:tgtEl>
+                </p:cond>
+              </p:nextCondLst>
+            </p:seq>
+          </p:childTnLst>
+        </p:cTn>
       </p:par>
     </p:tnLst>
   </p:timing>
@@ -3404,11 +3717,6 @@
               </a:rPr>
               <a:t>Just enough salt</a:t>
             </a:r>
-            <a:endParaRPr lang="en-GB" sz="2800" dirty="0" smtClean="0">
-              <a:solidFill>
-                <a:srgbClr val="FFC000"/>
-              </a:solidFill>
-            </a:endParaRPr>
           </a:p>
         </p:txBody>
       </p:sp>
@@ -3479,11 +3787,6 @@
               </a:rPr>
               <a:t>Too much salt                           </a:t>
             </a:r>
-            <a:endParaRPr lang="en-GB" sz="2800" dirty="0" smtClean="0">
-              <a:solidFill>
-                <a:srgbClr val="FFC000"/>
-              </a:solidFill>
-            </a:endParaRPr>
           </a:p>
         </p:txBody>
       </p:sp>
@@ -3912,59 +4215,102 @@
       </p:grpSpPr>
       <p:sp>
         <p:nvSpPr>
-          <p:cNvPr id="4" name="TextBox 3"/>
-          <p:cNvSpPr txBox="1"/>
-          <p:nvPr/>
-        </p:nvSpPr>
-        <p:spPr>
-          <a:xfrm>
-            <a:off x="1643042" y="2357430"/>
-            <a:ext cx="6643734" cy="1569660"/>
-          </a:xfrm>
-          <a:prstGeom prst="rect">
-            <a:avLst/>
-          </a:prstGeom>
-          <a:noFill/>
-        </p:spPr>
-        <p:txBody>
-          <a:bodyPr wrap="square" rtlCol="0">
-            <a:spAutoFit/>
-          </a:bodyPr>
-          <a:lstStyle/>
-          <a:p>
-            <a:r>
-              <a:rPr lang="en-US" sz="3200" dirty="0" smtClean="0">
+          <p:cNvPr id="2" name="Title 1"/>
+          <p:cNvSpPr>
+            <a:spLocks noGrp="1"/>
+          </p:cNvSpPr>
+          <p:nvPr>
+            <p:ph type="title"/>
+          </p:nvPr>
+        </p:nvSpPr>
+        <p:spPr/>
+        <p:txBody>
+          <a:bodyPr/>
+          <a:lstStyle/>
+          <a:p>
+            <a:r>
+              <a:rPr lang="en-GB" dirty="0" smtClean="0">
                 <a:solidFill>
-                  <a:schemeClr val="bg1"/>
+                  <a:srgbClr val="FFC000"/>
                 </a:solidFill>
               </a:rPr>
-              <a:t>Tell me and I'll forget.</a:t>
-            </a:r>
-          </a:p>
-          <a:p>
-            <a:r>
-              <a:rPr lang="en-US" sz="3200" dirty="0" smtClean="0">
+              <a:t>Why polymorphism?</a:t>
+            </a:r>
+            <a:endParaRPr lang="en-GB" dirty="0">
+              <a:solidFill>
+                <a:srgbClr val="FFC000"/>
+              </a:solidFill>
+            </a:endParaRPr>
+          </a:p>
+        </p:txBody>
+      </p:sp>
+      <p:sp>
+        <p:nvSpPr>
+          <p:cNvPr id="3" name="Content Placeholder 2"/>
+          <p:cNvSpPr>
+            <a:spLocks noGrp="1"/>
+          </p:cNvSpPr>
+          <p:nvPr>
+            <p:ph idx="1"/>
+          </p:nvPr>
+        </p:nvSpPr>
+        <p:spPr/>
+        <p:txBody>
+          <a:bodyPr/>
+          <a:lstStyle/>
+          <a:p>
+            <a:r>
+              <a:rPr lang="en-GB" dirty="0" smtClean="0">
                 <a:solidFill>
-                  <a:schemeClr val="bg1"/>
+                  <a:srgbClr val="FFC000"/>
                 </a:solidFill>
               </a:rPr>
-              <a:t>Show me and I might remember.</a:t>
-            </a:r>
-          </a:p>
-          <a:p>
-            <a:r>
-              <a:rPr lang="en-US" sz="3200" dirty="0" smtClean="0">
+              <a:t>Code is easier </a:t>
+            </a:r>
+            <a:r>
+              <a:rPr lang="en-GB" dirty="0" smtClean="0">
                 <a:solidFill>
-                  <a:schemeClr val="bg1"/>
+                  <a:srgbClr val="FFC000"/>
                 </a:solidFill>
               </a:rPr>
-              <a:t>But involve me and I will understand</a:t>
-            </a:r>
-            <a:endParaRPr lang="en-GB" sz="3200" dirty="0">
+              <a:t>to read</a:t>
+            </a:r>
+          </a:p>
+          <a:p>
+            <a:r>
+              <a:rPr lang="en-GB" dirty="0" smtClean="0">
+                <a:solidFill>
+                  <a:srgbClr val="FFC000"/>
+                </a:solidFill>
+              </a:rPr>
+              <a:t>Code is easier </a:t>
+            </a:r>
+            <a:r>
+              <a:rPr lang="en-GB" dirty="0" smtClean="0">
+                <a:solidFill>
+                  <a:srgbClr val="FFC000"/>
+                </a:solidFill>
+              </a:rPr>
+              <a:t>to test</a:t>
+            </a:r>
+          </a:p>
+          <a:p>
+            <a:r>
+              <a:rPr lang="en-GB" dirty="0" smtClean="0">
+                <a:solidFill>
+                  <a:srgbClr val="FFC000"/>
+                </a:solidFill>
+              </a:rPr>
+              <a:t>Code is easier maintain</a:t>
+            </a:r>
+            <a:endParaRPr lang="en-GB" dirty="0" smtClean="0">
               <a:solidFill>
-                <a:schemeClr val="bg1"/>
+                <a:srgbClr val="FFC000"/>
               </a:solidFill>
             </a:endParaRPr>
+          </a:p>
+          <a:p>
+            <a:endParaRPr lang="en-GB" dirty="0"/>
           </a:p>
         </p:txBody>
       </p:sp>
@@ -3984,6 +4330,190 @@
 </file>
 
 <file path=ppt/slides/slide5.xml><?xml version="1.0" encoding="utf-8"?>
+<p:sld xmlns:a="http://schemas.openxmlformats.org/drawingml/2006/main" xmlns:r="http://schemas.openxmlformats.org/officeDocument/2006/relationships" xmlns:p="http://schemas.openxmlformats.org/presentationml/2006/main">
+  <p:cSld>
+    <p:spTree>
+      <p:nvGrpSpPr>
+        <p:cNvPr id="1" name=""/>
+        <p:cNvGrpSpPr/>
+        <p:nvPr/>
+      </p:nvGrpSpPr>
+      <p:grpSpPr>
+        <a:xfrm>
+          <a:off x="0" y="0"/>
+          <a:ext cx="0" cy="0"/>
+          <a:chOff x="0" y="0"/>
+          <a:chExt cx="0" cy="0"/>
+        </a:xfrm>
+      </p:grpSpPr>
+      <p:sp>
+        <p:nvSpPr>
+          <p:cNvPr id="2" name="Title 1"/>
+          <p:cNvSpPr>
+            <a:spLocks noGrp="1"/>
+          </p:cNvSpPr>
+          <p:nvPr>
+            <p:ph type="title"/>
+          </p:nvPr>
+        </p:nvSpPr>
+        <p:spPr/>
+        <p:txBody>
+          <a:bodyPr/>
+          <a:lstStyle/>
+          <a:p>
+            <a:r>
+              <a:rPr lang="en-GB" dirty="0" err="1" smtClean="0">
+                <a:solidFill>
+                  <a:srgbClr val="FFC000"/>
+                </a:solidFill>
+              </a:rPr>
+              <a:t>Afrikan</a:t>
+            </a:r>
+            <a:r>
+              <a:rPr lang="en-GB" dirty="0" smtClean="0">
+                <a:solidFill>
+                  <a:srgbClr val="FFC000"/>
+                </a:solidFill>
+              </a:rPr>
+              <a:t> fusion restaurant</a:t>
+            </a:r>
+            <a:endParaRPr lang="en-GB" dirty="0">
+              <a:solidFill>
+                <a:srgbClr val="FFC000"/>
+              </a:solidFill>
+            </a:endParaRPr>
+          </a:p>
+        </p:txBody>
+      </p:sp>
+      <p:pic>
+        <p:nvPicPr>
+          <p:cNvPr id="4" name="Content Placeholder 3" descr="AfrikNFusion.jpg"/>
+          <p:cNvPicPr>
+            <a:picLocks noGrp="1" noChangeAspect="1"/>
+          </p:cNvPicPr>
+          <p:nvPr>
+            <p:ph idx="1"/>
+          </p:nvPr>
+        </p:nvPicPr>
+        <p:blipFill>
+          <a:blip r:embed="rId2"/>
+          <a:stretch>
+            <a:fillRect/>
+          </a:stretch>
+        </p:blipFill>
+        <p:spPr>
+          <a:xfrm>
+            <a:off x="1357290" y="1600200"/>
+            <a:ext cx="6357982" cy="4525963"/>
+          </a:xfrm>
+        </p:spPr>
+      </p:pic>
+    </p:spTree>
+  </p:cSld>
+  <p:clrMapOvr>
+    <a:masterClrMapping/>
+  </p:clrMapOvr>
+  <p:timing>
+    <p:tnLst>
+      <p:par>
+        <p:cTn id="1" dur="indefinite" restart="never" nodeType="tmRoot"/>
+      </p:par>
+    </p:tnLst>
+  </p:timing>
+</p:sld>
+</file>
+
+<file path=ppt/slides/slide6.xml><?xml version="1.0" encoding="utf-8"?>
+<p:sld xmlns:a="http://schemas.openxmlformats.org/drawingml/2006/main" xmlns:r="http://schemas.openxmlformats.org/officeDocument/2006/relationships" xmlns:p="http://schemas.openxmlformats.org/presentationml/2006/main">
+  <p:cSld>
+    <p:spTree>
+      <p:nvGrpSpPr>
+        <p:cNvPr id="1" name=""/>
+        <p:cNvGrpSpPr/>
+        <p:nvPr/>
+      </p:nvGrpSpPr>
+      <p:grpSpPr>
+        <a:xfrm>
+          <a:off x="0" y="0"/>
+          <a:ext cx="0" cy="0"/>
+          <a:chOff x="0" y="0"/>
+          <a:chExt cx="0" cy="0"/>
+        </a:xfrm>
+      </p:grpSpPr>
+      <p:sp>
+        <p:nvSpPr>
+          <p:cNvPr id="4" name="TextBox 3"/>
+          <p:cNvSpPr txBox="1"/>
+          <p:nvPr/>
+        </p:nvSpPr>
+        <p:spPr>
+          <a:xfrm>
+            <a:off x="1643042" y="2357430"/>
+            <a:ext cx="6643734" cy="1569660"/>
+          </a:xfrm>
+          <a:prstGeom prst="rect">
+            <a:avLst/>
+          </a:prstGeom>
+          <a:noFill/>
+        </p:spPr>
+        <p:txBody>
+          <a:bodyPr wrap="square" rtlCol="0">
+            <a:spAutoFit/>
+          </a:bodyPr>
+          <a:lstStyle/>
+          <a:p>
+            <a:r>
+              <a:rPr lang="en-US" sz="3200" dirty="0" smtClean="0">
+                <a:solidFill>
+                  <a:schemeClr val="bg1"/>
+                </a:solidFill>
+              </a:rPr>
+              <a:t>Tell me and I'll forget.</a:t>
+            </a:r>
+          </a:p>
+          <a:p>
+            <a:r>
+              <a:rPr lang="en-US" sz="3200" dirty="0" smtClean="0">
+                <a:solidFill>
+                  <a:schemeClr val="bg1"/>
+                </a:solidFill>
+              </a:rPr>
+              <a:t>Show me and I might remember.</a:t>
+            </a:r>
+          </a:p>
+          <a:p>
+            <a:r>
+              <a:rPr lang="en-US" sz="3200" dirty="0" smtClean="0">
+                <a:solidFill>
+                  <a:schemeClr val="bg1"/>
+                </a:solidFill>
+              </a:rPr>
+              <a:t>But involve me and I will understand</a:t>
+            </a:r>
+            <a:endParaRPr lang="en-GB" sz="3200" dirty="0">
+              <a:solidFill>
+                <a:schemeClr val="bg1"/>
+              </a:solidFill>
+            </a:endParaRPr>
+          </a:p>
+        </p:txBody>
+      </p:sp>
+    </p:spTree>
+  </p:cSld>
+  <p:clrMapOvr>
+    <a:masterClrMapping/>
+  </p:clrMapOvr>
+  <p:timing>
+    <p:tnLst>
+      <p:par>
+        <p:cTn id="1" dur="indefinite" restart="never" nodeType="tmRoot"/>
+      </p:par>
+    </p:tnLst>
+  </p:timing>
+</p:sld>
+</file>
+
+<file path=ppt/slides/slide7.xml><?xml version="1.0" encoding="utf-8"?>
 <p:sld xmlns:a="http://schemas.openxmlformats.org/drawingml/2006/main" xmlns:r="http://schemas.openxmlformats.org/officeDocument/2006/relationships" xmlns:p="http://schemas.openxmlformats.org/presentationml/2006/main">
   <p:cSld>
     <p:spTree>
@@ -4117,7 +4647,7 @@
 </p:sld>
 </file>
 
-<file path=ppt/slides/slide6.xml><?xml version="1.0" encoding="utf-8"?>
+<file path=ppt/slides/slide8.xml><?xml version="1.0" encoding="utf-8"?>
 <p:sld xmlns:a="http://schemas.openxmlformats.org/drawingml/2006/main" xmlns:r="http://schemas.openxmlformats.org/officeDocument/2006/relationships" xmlns:p="http://schemas.openxmlformats.org/presentationml/2006/main">
   <p:cSld>
     <p:spTree>

</xml_diff>